<commit_message>
updates in Tutorials, part translation to Dutch
</commit_message>
<xml_diff>
--- a/scratchClientTutorial/UK---English/UK - 2 - scratchCl Intermediate Tutorial.pptx
+++ b/scratchClientTutorial/UK---English/UK - 2 - scratchCl Intermediate Tutorial.pptx
@@ -221,7 +221,7 @@
             <a:fld id="{DB6A203D-5BB1-439B-9A8B-0C4974EC0C08}" type="datetimeFigureOut">
               <a:rPr lang="nl-NL" smtClean="0"/>
               <a:pPr/>
-              <a:t>21-5-2018</a:t>
+              <a:t>26-8-2018</a:t>
             </a:fld>
             <a:endParaRPr lang="nl-NL"/>
           </a:p>
@@ -5199,7 +5199,7 @@
         </p:spPr>
         <p:txBody>
           <a:bodyPr>
-            <a:normAutofit lnSpcReduction="10000"/>
+            <a:normAutofit/>
           </a:bodyPr>
           <a:lstStyle/>
           <a:p>
@@ -5248,25 +5248,7 @@
                   <a:schemeClr val="bg1"/>
                 </a:solidFill>
               </a:rPr>
-              <a:t>Pi And More 10 1/2</a:t>
-            </a:r>
-          </a:p>
-          <a:p>
-            <a:r>
-              <a:rPr lang="en-US" dirty="0" smtClean="0">
-                <a:solidFill>
-                  <a:schemeClr val="bg1"/>
-                </a:solidFill>
-              </a:rPr>
-              <a:t>Stuttgart – 24 February </a:t>
-            </a:r>
-            <a:r>
-              <a:rPr lang="en-US" dirty="0" smtClean="0">
-                <a:solidFill>
-                  <a:schemeClr val="bg1"/>
-                </a:solidFill>
-              </a:rPr>
-              <a:t>2018 </a:t>
+              <a:t>Workshop for the Pi And More conference</a:t>
             </a:r>
             <a:endParaRPr lang="nl-NL" dirty="0">
               <a:solidFill>
@@ -6203,7 +6185,7 @@
                   <a:schemeClr val="bg1"/>
                 </a:solidFill>
               </a:rPr>
-              <a:t>Don’t forget: power off and USB cable out before making changes!</a:t>
+              <a:t>Don’t forget: 9V and USB cable out before making changes!</a:t>
             </a:r>
             <a:endParaRPr lang="nl-NL" dirty="0">
               <a:solidFill>
@@ -6353,8 +6335,9 @@
           <a:p>
             <a:r>
               <a:rPr lang="en-US" dirty="0" smtClean="0"/>
-              <a:t>Switch the power on again and reconnect</a:t>
-            </a:r>
+              <a:t>Reconnect USB and 9V adapter</a:t>
+            </a:r>
+            <a:endParaRPr lang="en-US" dirty="0" smtClean="0"/>
           </a:p>
           <a:p>
             <a:r>
@@ -6404,22 +6387,13 @@
             </a:r>
             <a:r>
               <a:rPr lang="en-US" dirty="0" smtClean="0"/>
-              <a:t>values between 0 and </a:t>
-            </a:r>
+              <a:t>values between 0 and 255</a:t>
+            </a:r>
+          </a:p>
+          <a:p>
             <a:r>
               <a:rPr lang="en-US" dirty="0" smtClean="0"/>
-              <a:t>255</a:t>
-            </a:r>
-            <a:endParaRPr lang="en-US" dirty="0" smtClean="0"/>
-          </a:p>
-          <a:p>
-            <a:r>
-              <a:rPr lang="en-US" dirty="0" smtClean="0"/>
-              <a:t>Does </a:t>
-            </a:r>
-            <a:r>
-              <a:rPr lang="en-US" dirty="0" smtClean="0"/>
-              <a:t>the LED brightness change?</a:t>
+              <a:t>Does the LED brightness change?</a:t>
             </a:r>
             <a:endParaRPr lang="nl-NL" dirty="0"/>
           </a:p>
@@ -6531,15 +6505,7 @@
           <a:p>
             <a:r>
               <a:rPr lang="en-US" dirty="0" smtClean="0"/>
-              <a:t>Make some code that takes the potentiometer reading (between 0 and </a:t>
-            </a:r>
-            <a:r>
-              <a:rPr lang="en-US" dirty="0" smtClean="0"/>
-              <a:t>1023) </a:t>
-            </a:r>
-            <a:r>
-              <a:rPr lang="en-US" dirty="0" smtClean="0"/>
-              <a:t>and transforms it into the range 0 to 255 (so divide by 4) and set the value of </a:t>
+              <a:t>Make some code that takes the potentiometer reading (between 0 and 1023) and transforms it into the range 0 to 255 (so divide by 4) and set the value of </a:t>
             </a:r>
             <a:r>
               <a:rPr lang="en-US" i="1" dirty="0" err="1" smtClean="0"/>
@@ -7540,7 +7506,23 @@
                   <a:schemeClr val="bg1"/>
                 </a:solidFill>
               </a:rPr>
-              <a:t>Don’t forget: power off and USB cable out before making changes!</a:t>
+              <a:t>Don’t forget: </a:t>
+            </a:r>
+            <a:r>
+              <a:rPr lang="en-US" dirty="0" smtClean="0">
+                <a:solidFill>
+                  <a:schemeClr val="bg1"/>
+                </a:solidFill>
+              </a:rPr>
+              <a:t>9V and </a:t>
+            </a:r>
+            <a:r>
+              <a:rPr lang="en-US" dirty="0" smtClean="0">
+                <a:solidFill>
+                  <a:schemeClr val="bg1"/>
+                </a:solidFill>
+              </a:rPr>
+              <a:t>USB cable out before making changes!</a:t>
             </a:r>
             <a:endParaRPr lang="nl-NL" dirty="0">
               <a:solidFill>
@@ -7773,11 +7755,7 @@
           <a:p>
             <a:r>
               <a:rPr lang="en-US" dirty="0" smtClean="0"/>
-              <a:t>Update </a:t>
-            </a:r>
-            <a:r>
-              <a:rPr lang="en-US" dirty="0" smtClean="0"/>
-              <a:t>the loop where you set the </a:t>
+              <a:t>Update the loop where you set the </a:t>
             </a:r>
             <a:r>
               <a:rPr lang="en-US" i="1" dirty="0" smtClean="0"/>
@@ -8830,7 +8808,7 @@
                   <a:schemeClr val="bg1"/>
                 </a:solidFill>
               </a:rPr>
-              <a:t>Don’t forget: power off and USB cable out before updating!</a:t>
+              <a:t>Don’t forget: 9V and USB cable out before making changes!</a:t>
             </a:r>
             <a:endParaRPr lang="nl-NL" dirty="0">
               <a:solidFill>
@@ -9145,11 +9123,7 @@
           <a:p>
             <a:r>
               <a:rPr lang="en-US" dirty="0" smtClean="0"/>
-              <a:t>Add </a:t>
-            </a:r>
-            <a:r>
-              <a:rPr lang="en-US" dirty="0" smtClean="0"/>
-              <a:t>the setting of the buzzer to the loop where you already set the servo and the Big Blue LED.</a:t>
+              <a:t>Add the setting of the buzzer to the loop where you already set the servo and the Big Blue LED.</a:t>
             </a:r>
           </a:p>
           <a:p>
@@ -9475,7 +9449,19 @@
             <a:pPr algn="ctr"/>
             <a:r>
               <a:rPr lang="en-US" dirty="0" smtClean="0"/>
-              <a:t>Part 11: Summary &amp; take </a:t>
+              <a:t>Part </a:t>
+            </a:r>
+            <a:r>
+              <a:rPr lang="en-US" dirty="0" smtClean="0"/>
+              <a:t>3</a:t>
+            </a:r>
+            <a:r>
+              <a:rPr lang="en-US" dirty="0" smtClean="0"/>
+              <a:t>: </a:t>
+            </a:r>
+            <a:r>
+              <a:rPr lang="en-US" dirty="0" smtClean="0"/>
+              <a:t>Summary &amp; take </a:t>
             </a:r>
             <a:r>
               <a:rPr lang="en-US" dirty="0" err="1" smtClean="0"/>
@@ -9549,7 +9535,12 @@
             <p:ph type="title"/>
           </p:nvPr>
         </p:nvSpPr>
-        <p:spPr/>
+        <p:spPr>
+          <a:xfrm>
+            <a:off x="395536" y="51470"/>
+            <a:ext cx="8229600" cy="857250"/>
+          </a:xfrm>
+        </p:spPr>
         <p:txBody>
           <a:bodyPr>
             <a:normAutofit fontScale="90000"/>
@@ -9558,15 +9549,7 @@
           <a:p>
             <a:r>
               <a:rPr lang="en-US" dirty="0" smtClean="0"/>
-              <a:t>Takeaways </a:t>
-            </a:r>
-            <a:r>
-              <a:rPr lang="en-US" dirty="0" smtClean="0"/>
-              <a:t>of the </a:t>
-            </a:r>
-            <a:r>
-              <a:rPr lang="en-US" dirty="0" smtClean="0"/>
-              <a:t>beginners and intermediate workshops</a:t>
+              <a:t>Takeaways of the beginners and intermediate workshops</a:t>
             </a:r>
             <a:endParaRPr lang="nl-NL" dirty="0"/>
           </a:p>
@@ -9590,246 +9573,91 @@
         </p:spPr>
         <p:txBody>
           <a:bodyPr>
-            <a:normAutofit fontScale="55000" lnSpcReduction="20000"/>
+            <a:normAutofit/>
           </a:bodyPr>
           <a:lstStyle/>
           <a:p>
             <a:r>
-              <a:rPr lang="en-US" dirty="0" smtClean="0"/>
+              <a:rPr lang="en-US" sz="1400" dirty="0" smtClean="0"/>
               <a:t>Functions that a pin on </a:t>
             </a:r>
             <a:r>
-              <a:rPr lang="en-US" dirty="0" err="1" smtClean="0"/>
+              <a:rPr lang="en-US" sz="1400" dirty="0" err="1" smtClean="0"/>
               <a:t>Arduino</a:t>
             </a:r>
             <a:r>
-              <a:rPr lang="en-US" dirty="0" smtClean="0"/>
+              <a:rPr lang="en-US" sz="1400" dirty="0" smtClean="0"/>
               <a:t> can have:</a:t>
             </a:r>
           </a:p>
           <a:p>
             <a:pPr lvl="1"/>
             <a:r>
-              <a:rPr lang="en-US" dirty="0" smtClean="0"/>
+              <a:rPr lang="en-US" sz="1200" dirty="0" smtClean="0"/>
               <a:t>Digital In</a:t>
             </a:r>
           </a:p>
           <a:p>
             <a:pPr lvl="1"/>
             <a:r>
-              <a:rPr lang="en-US" dirty="0" smtClean="0"/>
+              <a:rPr lang="en-US" sz="1200" dirty="0" smtClean="0"/>
               <a:t>Digital Out</a:t>
             </a:r>
           </a:p>
           <a:p>
             <a:pPr lvl="1"/>
             <a:r>
-              <a:rPr lang="en-US" dirty="0" smtClean="0"/>
+              <a:rPr lang="en-US" sz="1200" dirty="0" smtClean="0"/>
               <a:t>Analog In</a:t>
             </a:r>
           </a:p>
           <a:p>
             <a:pPr lvl="1"/>
             <a:r>
-              <a:rPr lang="en-US" i="1" dirty="0" smtClean="0"/>
+              <a:rPr lang="en-US" sz="1200" i="1" dirty="0" smtClean="0"/>
               <a:t>No Analog Out</a:t>
             </a:r>
           </a:p>
           <a:p>
             <a:pPr lvl="1"/>
             <a:r>
-              <a:rPr lang="en-US" dirty="0" smtClean="0"/>
-              <a:t>Pulse Width Modulation as </a:t>
-            </a:r>
-            <a:r>
-              <a:rPr lang="en-US" dirty="0" smtClean="0"/>
-              <a:t>alternative for Analog Out</a:t>
-            </a:r>
-            <a:endParaRPr lang="en-US" dirty="0" smtClean="0"/>
+              <a:rPr lang="en-US" sz="1200" dirty="0" smtClean="0"/>
+              <a:t>Pulse Width Modulation as alternative for Analog Out</a:t>
+            </a:r>
           </a:p>
           <a:p>
             <a:pPr lvl="2"/>
             <a:r>
-              <a:rPr lang="en-US" dirty="0" smtClean="0"/>
+              <a:rPr lang="en-US" sz="1100" dirty="0" smtClean="0"/>
               <a:t>For modulating the brightness of a LED</a:t>
             </a:r>
           </a:p>
           <a:p>
             <a:pPr lvl="2"/>
             <a:r>
-              <a:rPr lang="en-US" dirty="0" smtClean="0"/>
+              <a:rPr lang="en-US" sz="1100" dirty="0" smtClean="0"/>
               <a:t>For controlling a servo</a:t>
             </a:r>
           </a:p>
           <a:p>
             <a:pPr lvl="2"/>
             <a:r>
-              <a:rPr lang="en-US" dirty="0" smtClean="0"/>
+              <a:rPr lang="en-US" sz="1100" dirty="0" smtClean="0"/>
               <a:t>For controlling a buzzer</a:t>
             </a:r>
           </a:p>
           <a:p>
             <a:pPr lvl="1"/>
             <a:r>
-              <a:rPr lang="en-US" dirty="0" smtClean="0"/>
+              <a:rPr lang="en-US" sz="1200" dirty="0" smtClean="0"/>
               <a:t>There a few more, see the advanced workshop</a:t>
             </a:r>
           </a:p>
           <a:p>
             <a:pPr lvl="1"/>
             <a:r>
-              <a:rPr lang="en-US" dirty="0" smtClean="0"/>
+              <a:rPr lang="en-US" sz="1200" dirty="0" smtClean="0"/>
               <a:t>You can configure pull up resistors on Digital In</a:t>
-            </a:r>
-          </a:p>
-        </p:txBody>
-      </p:sp>
-      <p:sp>
-        <p:nvSpPr>
-          <p:cNvPr id="5" name="Tijdelijke aanduiding voor inhoud 4"/>
-          <p:cNvSpPr>
-            <a:spLocks noGrp="1"/>
-          </p:cNvSpPr>
-          <p:nvPr>
-            <p:ph sz="half" idx="2"/>
-          </p:nvPr>
-        </p:nvSpPr>
-        <p:spPr>
-          <a:xfrm>
-            <a:off x="539552" y="1131590"/>
-            <a:ext cx="5328592" cy="3744416"/>
-          </a:xfrm>
-        </p:spPr>
-        <p:txBody>
-          <a:bodyPr>
-            <a:normAutofit fontScale="55000" lnSpcReduction="20000"/>
-          </a:bodyPr>
-          <a:lstStyle/>
-          <a:p>
-            <a:r>
-              <a:rPr lang="en-US" dirty="0" smtClean="0"/>
-              <a:t>With </a:t>
-            </a:r>
-            <a:r>
-              <a:rPr lang="en-US" dirty="0" err="1" smtClean="0"/>
-              <a:t>scratchClient</a:t>
-            </a:r>
-            <a:r>
-              <a:rPr lang="en-US" dirty="0" smtClean="0"/>
-              <a:t> you </a:t>
-            </a:r>
-            <a:r>
-              <a:rPr lang="en-US" dirty="0" smtClean="0"/>
-              <a:t>define:</a:t>
-            </a:r>
-            <a:endParaRPr lang="en-US" dirty="0" smtClean="0"/>
-          </a:p>
-          <a:p>
-            <a:pPr lvl="1"/>
-            <a:r>
-              <a:rPr lang="en-US" dirty="0" smtClean="0"/>
-              <a:t>Function of each pin</a:t>
-            </a:r>
-          </a:p>
-          <a:p>
-            <a:pPr lvl="1"/>
-            <a:r>
-              <a:rPr lang="en-US" dirty="0" smtClean="0"/>
-              <a:t>Symbolic name for each configured pin</a:t>
-            </a:r>
-          </a:p>
-          <a:p>
-            <a:r>
-              <a:rPr lang="en-US" dirty="0" err="1" smtClean="0"/>
-              <a:t>scratchClient</a:t>
-            </a:r>
-            <a:r>
-              <a:rPr lang="en-US" dirty="0" smtClean="0"/>
-              <a:t> </a:t>
-            </a:r>
-            <a:r>
-              <a:rPr lang="en-US" dirty="0" err="1" smtClean="0"/>
-              <a:t>config</a:t>
-            </a:r>
-            <a:r>
-              <a:rPr lang="en-US" dirty="0" smtClean="0"/>
-              <a:t> is the tool to setup the configuration </a:t>
-            </a:r>
-          </a:p>
-          <a:p>
-            <a:r>
-              <a:rPr lang="en-US" dirty="0" smtClean="0"/>
-              <a:t>Restart </a:t>
-            </a:r>
-            <a:r>
-              <a:rPr lang="en-US" dirty="0" err="1" smtClean="0"/>
-              <a:t>scratchClient</a:t>
-            </a:r>
-            <a:r>
-              <a:rPr lang="en-US" dirty="0" smtClean="0"/>
-              <a:t> after you changed the configuration</a:t>
-            </a:r>
-          </a:p>
-          <a:p>
-            <a:r>
-              <a:rPr lang="en-US" dirty="0" smtClean="0"/>
-              <a:t>Put a resistor in series with LEDs</a:t>
-            </a:r>
-          </a:p>
-          <a:p>
-            <a:r>
-              <a:rPr lang="en-US" dirty="0" smtClean="0"/>
-              <a:t>Put a resistor in series with switches</a:t>
-            </a:r>
-          </a:p>
-          <a:p>
-            <a:r>
-              <a:rPr lang="en-US" dirty="0" smtClean="0"/>
-              <a:t>Put a resistor in series with the middle contact of a potentiometer.</a:t>
-            </a:r>
-          </a:p>
-          <a:p>
-            <a:r>
-              <a:rPr lang="en-US" dirty="0" smtClean="0"/>
-              <a:t>Configure a pull up resistor if the input signal goes between 0 Volt and being open rather than between 0 Volt and 3 to 5 Volt.</a:t>
-            </a:r>
-          </a:p>
-          <a:p>
-            <a:r>
-              <a:rPr lang="en-US" dirty="0" smtClean="0"/>
-              <a:t>Output signals are controlled from Scratch </a:t>
-            </a:r>
-            <a:r>
-              <a:rPr lang="en-US" dirty="0" smtClean="0"/>
-              <a:t>via the extension blocks</a:t>
-            </a:r>
-            <a:endParaRPr lang="en-US" dirty="0" smtClean="0"/>
-          </a:p>
-          <a:p>
-            <a:r>
-              <a:rPr lang="en-US" dirty="0" smtClean="0"/>
-              <a:t>Input signals are </a:t>
-            </a:r>
-            <a:r>
-              <a:rPr lang="en-US" dirty="0" smtClean="0"/>
-              <a:t>obtained via extension blocks</a:t>
-            </a:r>
-            <a:endParaRPr lang="en-US" dirty="0" smtClean="0"/>
-          </a:p>
-          <a:p>
-            <a:r>
-              <a:rPr lang="en-US" dirty="0" smtClean="0"/>
-              <a:t>You can monitor the value of all pins from the browser</a:t>
-            </a:r>
-          </a:p>
-          <a:p>
-            <a:r>
-              <a:rPr lang="en-US" b="1" dirty="0" err="1" smtClean="0"/>
-              <a:t>scratchClient</a:t>
-            </a:r>
-            <a:r>
-              <a:rPr lang="en-US" b="1" dirty="0" smtClean="0"/>
-              <a:t> can do much more…</a:t>
             </a:r>
           </a:p>
         </p:txBody>
@@ -9855,6 +9683,584 @@
               <a:t>22</a:t>
             </a:fld>
             <a:endParaRPr lang="nl-NL" dirty="0"/>
+          </a:p>
+        </p:txBody>
+      </p:sp>
+      <p:sp>
+        <p:nvSpPr>
+          <p:cNvPr id="7" name="Tijdelijke aanduiding voor inhoud 4"/>
+          <p:cNvSpPr txBox="1">
+            <a:spLocks/>
+          </p:cNvSpPr>
+          <p:nvPr/>
+        </p:nvSpPr>
+        <p:spPr>
+          <a:xfrm>
+            <a:off x="539552" y="987574"/>
+            <a:ext cx="5616624" cy="3744416"/>
+          </a:xfrm>
+          <a:prstGeom prst="rect">
+            <a:avLst/>
+          </a:prstGeom>
+        </p:spPr>
+        <p:txBody>
+          <a:bodyPr vert="horz" lIns="91440" tIns="45720" rIns="91440" bIns="45720" rtlCol="0">
+            <a:normAutofit fontScale="55000" lnSpcReduction="20000"/>
+          </a:bodyPr>
+          <a:lstStyle/>
+          <a:p>
+            <a:pPr marL="179388" marR="0" lvl="0" indent="-179388" algn="l" defTabSz="914400" rtl="0" eaLnBrk="1" fontAlgn="auto" latinLnBrk="0" hangingPunct="1">
+              <a:lnSpc>
+                <a:spcPct val="100000"/>
+              </a:lnSpc>
+              <a:spcBef>
+                <a:spcPct val="20000"/>
+              </a:spcBef>
+              <a:spcAft>
+                <a:spcPts val="0"/>
+              </a:spcAft>
+              <a:buClrTx/>
+              <a:buSzTx/>
+              <a:buFont typeface="Arial" pitchFamily="34" charset="0"/>
+              <a:buChar char="•"/>
+              <a:tabLst/>
+              <a:defRPr/>
+            </a:pPr>
+            <a:r>
+              <a:rPr kumimoji="0" lang="en-US" sz="2800" b="0" i="0" u="none" strike="noStrike" kern="1200" cap="none" spc="0" normalizeH="0" baseline="0" noProof="0" smtClean="0">
+                <a:ln>
+                  <a:noFill/>
+                </a:ln>
+                <a:solidFill>
+                  <a:schemeClr val="tx1"/>
+                </a:solidFill>
+                <a:effectLst/>
+                <a:uLnTx/>
+                <a:uFillTx/>
+                <a:latin typeface="+mn-lt"/>
+                <a:ea typeface="+mn-ea"/>
+                <a:cs typeface="+mn-cs"/>
+              </a:rPr>
+              <a:t>With scratchClient you define:</a:t>
+            </a:r>
+          </a:p>
+          <a:p>
+            <a:pPr marL="447675" marR="0" lvl="1" indent="-193675" algn="l" defTabSz="914400" rtl="0" eaLnBrk="1" fontAlgn="auto" latinLnBrk="0" hangingPunct="1">
+              <a:lnSpc>
+                <a:spcPct val="100000"/>
+              </a:lnSpc>
+              <a:spcBef>
+                <a:spcPct val="20000"/>
+              </a:spcBef>
+              <a:spcAft>
+                <a:spcPts val="0"/>
+              </a:spcAft>
+              <a:buClrTx/>
+              <a:buSzTx/>
+              <a:buFont typeface="Arial" pitchFamily="34" charset="0"/>
+              <a:buChar char="–"/>
+              <a:tabLst/>
+              <a:defRPr/>
+            </a:pPr>
+            <a:r>
+              <a:rPr kumimoji="0" lang="en-US" sz="2400" b="0" i="0" u="none" strike="noStrike" kern="1200" cap="none" spc="0" normalizeH="0" baseline="0" noProof="0" smtClean="0">
+                <a:ln>
+                  <a:noFill/>
+                </a:ln>
+                <a:solidFill>
+                  <a:schemeClr val="tx1"/>
+                </a:solidFill>
+                <a:effectLst/>
+                <a:uLnTx/>
+                <a:uFillTx/>
+                <a:latin typeface="+mn-lt"/>
+                <a:ea typeface="+mn-ea"/>
+                <a:cs typeface="+mn-cs"/>
+              </a:rPr>
+              <a:t>Function of each pin</a:t>
+            </a:r>
+          </a:p>
+          <a:p>
+            <a:pPr marL="447675" marR="0" lvl="1" indent="-193675" algn="l" defTabSz="914400" rtl="0" eaLnBrk="1" fontAlgn="auto" latinLnBrk="0" hangingPunct="1">
+              <a:lnSpc>
+                <a:spcPct val="100000"/>
+              </a:lnSpc>
+              <a:spcBef>
+                <a:spcPct val="20000"/>
+              </a:spcBef>
+              <a:spcAft>
+                <a:spcPts val="0"/>
+              </a:spcAft>
+              <a:buClrTx/>
+              <a:buSzTx/>
+              <a:buFont typeface="Arial" pitchFamily="34" charset="0"/>
+              <a:buChar char="–"/>
+              <a:tabLst/>
+              <a:defRPr/>
+            </a:pPr>
+            <a:r>
+              <a:rPr kumimoji="0" lang="en-US" sz="2400" b="0" i="0" u="none" strike="noStrike" kern="1200" cap="none" spc="0" normalizeH="0" baseline="0" noProof="0" smtClean="0">
+                <a:ln>
+                  <a:noFill/>
+                </a:ln>
+                <a:solidFill>
+                  <a:schemeClr val="tx1"/>
+                </a:solidFill>
+                <a:effectLst/>
+                <a:uLnTx/>
+                <a:uFillTx/>
+                <a:latin typeface="+mn-lt"/>
+                <a:ea typeface="+mn-ea"/>
+                <a:cs typeface="+mn-cs"/>
+              </a:rPr>
+              <a:t>Symbolic name for each configured pin</a:t>
+            </a:r>
+          </a:p>
+          <a:p>
+            <a:pPr marL="179388" marR="0" lvl="0" indent="-179388" algn="l" defTabSz="914400" rtl="0" eaLnBrk="1" fontAlgn="auto" latinLnBrk="0" hangingPunct="1">
+              <a:lnSpc>
+                <a:spcPct val="100000"/>
+              </a:lnSpc>
+              <a:spcBef>
+                <a:spcPct val="20000"/>
+              </a:spcBef>
+              <a:spcAft>
+                <a:spcPts val="0"/>
+              </a:spcAft>
+              <a:buClrTx/>
+              <a:buSzTx/>
+              <a:buFont typeface="Arial" pitchFamily="34" charset="0"/>
+              <a:buChar char="•"/>
+              <a:tabLst/>
+              <a:defRPr/>
+            </a:pPr>
+            <a:r>
+              <a:rPr kumimoji="0" lang="en-US" sz="2800" b="0" i="0" u="none" strike="noStrike" kern="1200" cap="none" spc="0" normalizeH="0" baseline="0" noProof="0" smtClean="0">
+                <a:ln>
+                  <a:noFill/>
+                </a:ln>
+                <a:solidFill>
+                  <a:schemeClr val="tx1"/>
+                </a:solidFill>
+                <a:effectLst/>
+                <a:uLnTx/>
+                <a:uFillTx/>
+                <a:latin typeface="+mn-lt"/>
+                <a:ea typeface="+mn-ea"/>
+                <a:cs typeface="+mn-cs"/>
+              </a:rPr>
+              <a:t>scratchClient config is the tool to setup the configuration </a:t>
+            </a:r>
+          </a:p>
+          <a:p>
+            <a:pPr marL="179388" marR="0" lvl="0" indent="-179388" algn="l" defTabSz="914400" rtl="0" eaLnBrk="1" fontAlgn="auto" latinLnBrk="0" hangingPunct="1">
+              <a:lnSpc>
+                <a:spcPct val="100000"/>
+              </a:lnSpc>
+              <a:spcBef>
+                <a:spcPct val="20000"/>
+              </a:spcBef>
+              <a:spcAft>
+                <a:spcPts val="0"/>
+              </a:spcAft>
+              <a:buClrTx/>
+              <a:buSzTx/>
+              <a:buFont typeface="Arial" pitchFamily="34" charset="0"/>
+              <a:buChar char="•"/>
+              <a:tabLst/>
+              <a:defRPr/>
+            </a:pPr>
+            <a:r>
+              <a:rPr kumimoji="0" lang="en-US" sz="2800" b="0" i="0" u="none" strike="noStrike" kern="1200" cap="none" spc="0" normalizeH="0" baseline="0" noProof="0" smtClean="0">
+                <a:ln>
+                  <a:noFill/>
+                </a:ln>
+                <a:solidFill>
+                  <a:schemeClr val="tx1"/>
+                </a:solidFill>
+                <a:effectLst/>
+                <a:uLnTx/>
+                <a:uFillTx/>
+                <a:latin typeface="+mn-lt"/>
+                <a:ea typeface="+mn-ea"/>
+                <a:cs typeface="+mn-cs"/>
+              </a:rPr>
+              <a:t>Restart scratchClient after you changed the configuration</a:t>
+            </a:r>
+          </a:p>
+          <a:p>
+            <a:pPr marL="179388" marR="0" lvl="0" indent="-179388" algn="l" defTabSz="914400" rtl="0" eaLnBrk="1" fontAlgn="auto" latinLnBrk="0" hangingPunct="1">
+              <a:lnSpc>
+                <a:spcPct val="100000"/>
+              </a:lnSpc>
+              <a:spcBef>
+                <a:spcPct val="20000"/>
+              </a:spcBef>
+              <a:spcAft>
+                <a:spcPts val="0"/>
+              </a:spcAft>
+              <a:buClrTx/>
+              <a:buSzTx/>
+              <a:buFont typeface="Arial" pitchFamily="34" charset="0"/>
+              <a:buChar char="•"/>
+              <a:tabLst/>
+              <a:defRPr/>
+            </a:pPr>
+            <a:r>
+              <a:rPr kumimoji="0" lang="en-US" sz="2800" b="0" i="0" u="none" strike="noStrike" kern="1200" cap="none" spc="0" normalizeH="0" baseline="0" noProof="0" smtClean="0">
+                <a:ln>
+                  <a:noFill/>
+                </a:ln>
+                <a:solidFill>
+                  <a:schemeClr val="tx1"/>
+                </a:solidFill>
+                <a:effectLst/>
+                <a:uLnTx/>
+                <a:uFillTx/>
+                <a:latin typeface="+mn-lt"/>
+                <a:ea typeface="+mn-ea"/>
+                <a:cs typeface="+mn-cs"/>
+              </a:rPr>
+              <a:t>Put a resistor in series with LEDs</a:t>
+            </a:r>
+          </a:p>
+          <a:p>
+            <a:pPr marL="179388" marR="0" lvl="0" indent="-179388" algn="l" defTabSz="914400" rtl="0" eaLnBrk="1" fontAlgn="auto" latinLnBrk="0" hangingPunct="1">
+              <a:lnSpc>
+                <a:spcPct val="100000"/>
+              </a:lnSpc>
+              <a:spcBef>
+                <a:spcPct val="20000"/>
+              </a:spcBef>
+              <a:spcAft>
+                <a:spcPts val="0"/>
+              </a:spcAft>
+              <a:buClrTx/>
+              <a:buSzTx/>
+              <a:buFont typeface="Arial" pitchFamily="34" charset="0"/>
+              <a:buChar char="•"/>
+              <a:tabLst/>
+              <a:defRPr/>
+            </a:pPr>
+            <a:r>
+              <a:rPr kumimoji="0" lang="en-US" sz="2800" b="0" i="0" u="none" strike="noStrike" kern="1200" cap="none" spc="0" normalizeH="0" baseline="0" noProof="0" smtClean="0">
+                <a:ln>
+                  <a:noFill/>
+                </a:ln>
+                <a:solidFill>
+                  <a:schemeClr val="tx1"/>
+                </a:solidFill>
+                <a:effectLst/>
+                <a:uLnTx/>
+                <a:uFillTx/>
+                <a:latin typeface="+mn-lt"/>
+                <a:ea typeface="+mn-ea"/>
+                <a:cs typeface="+mn-cs"/>
+              </a:rPr>
+              <a:t>Put a resistor in series with switches</a:t>
+            </a:r>
+          </a:p>
+          <a:p>
+            <a:pPr marL="179388" marR="0" lvl="0" indent="-179388" algn="l" defTabSz="914400" rtl="0" eaLnBrk="1" fontAlgn="auto" latinLnBrk="0" hangingPunct="1">
+              <a:lnSpc>
+                <a:spcPct val="100000"/>
+              </a:lnSpc>
+              <a:spcBef>
+                <a:spcPct val="20000"/>
+              </a:spcBef>
+              <a:spcAft>
+                <a:spcPts val="0"/>
+              </a:spcAft>
+              <a:buClrTx/>
+              <a:buSzTx/>
+              <a:buFont typeface="Arial" pitchFamily="34" charset="0"/>
+              <a:buChar char="•"/>
+              <a:tabLst/>
+              <a:defRPr/>
+            </a:pPr>
+            <a:r>
+              <a:rPr kumimoji="0" lang="en-US" sz="2800" b="0" i="0" u="none" strike="noStrike" kern="1200" cap="none" spc="0" normalizeH="0" baseline="0" noProof="0" smtClean="0">
+                <a:ln>
+                  <a:noFill/>
+                </a:ln>
+                <a:solidFill>
+                  <a:schemeClr val="tx1"/>
+                </a:solidFill>
+                <a:effectLst/>
+                <a:uLnTx/>
+                <a:uFillTx/>
+                <a:latin typeface="+mn-lt"/>
+                <a:ea typeface="+mn-ea"/>
+                <a:cs typeface="+mn-cs"/>
+              </a:rPr>
+              <a:t>Configure a pull up resistor if the input signal goes between 0 Volt and being open rather than between 0 Volt and 3 to 5 Volt.</a:t>
+            </a:r>
+          </a:p>
+          <a:p>
+            <a:pPr marL="179388" marR="0" lvl="0" indent="-179388" algn="l" defTabSz="914400" rtl="0" eaLnBrk="1" fontAlgn="auto" latinLnBrk="0" hangingPunct="1">
+              <a:lnSpc>
+                <a:spcPct val="100000"/>
+              </a:lnSpc>
+              <a:spcBef>
+                <a:spcPct val="20000"/>
+              </a:spcBef>
+              <a:spcAft>
+                <a:spcPts val="0"/>
+              </a:spcAft>
+              <a:buClrTx/>
+              <a:buSzTx/>
+              <a:buFont typeface="Arial" pitchFamily="34" charset="0"/>
+              <a:buChar char="•"/>
+              <a:tabLst/>
+              <a:defRPr/>
+            </a:pPr>
+            <a:r>
+              <a:rPr kumimoji="0" lang="en-US" sz="2800" b="0" i="0" u="none" strike="noStrike" kern="1200" cap="none" spc="0" normalizeH="0" baseline="0" noProof="0" smtClean="0">
+                <a:ln>
+                  <a:noFill/>
+                </a:ln>
+                <a:solidFill>
+                  <a:schemeClr val="tx1"/>
+                </a:solidFill>
+                <a:effectLst/>
+                <a:uLnTx/>
+                <a:uFillTx/>
+                <a:latin typeface="+mn-lt"/>
+                <a:ea typeface="+mn-ea"/>
+                <a:cs typeface="+mn-cs"/>
+              </a:rPr>
+              <a:t>In Scratch 2, you use the extension block for scratchClient to get blocks that you can use to interact with scratchClient</a:t>
+            </a:r>
+          </a:p>
+          <a:p>
+            <a:pPr marL="179388" marR="0" lvl="0" indent="-179388" algn="l" defTabSz="914400" rtl="0" eaLnBrk="1" fontAlgn="auto" latinLnBrk="0" hangingPunct="1">
+              <a:lnSpc>
+                <a:spcPct val="100000"/>
+              </a:lnSpc>
+              <a:spcBef>
+                <a:spcPct val="20000"/>
+              </a:spcBef>
+              <a:spcAft>
+                <a:spcPts val="0"/>
+              </a:spcAft>
+              <a:buClrTx/>
+              <a:buSzTx/>
+              <a:buFont typeface="Arial" pitchFamily="34" charset="0"/>
+              <a:buChar char="•"/>
+              <a:tabLst/>
+              <a:defRPr/>
+            </a:pPr>
+            <a:r>
+              <a:rPr kumimoji="0" lang="en-US" sz="2800" b="0" i="0" u="none" strike="noStrike" kern="1200" cap="none" spc="0" normalizeH="0" baseline="0" noProof="0" smtClean="0">
+                <a:ln>
+                  <a:noFill/>
+                </a:ln>
+                <a:solidFill>
+                  <a:schemeClr val="tx1"/>
+                </a:solidFill>
+                <a:effectLst/>
+                <a:uLnTx/>
+                <a:uFillTx/>
+                <a:latin typeface="+mn-lt"/>
+                <a:ea typeface="+mn-ea"/>
+                <a:cs typeface="+mn-cs"/>
+              </a:rPr>
+              <a:t>You can monitor the value of all pins from the browser</a:t>
+            </a:r>
+          </a:p>
+          <a:p>
+            <a:pPr marL="179388" marR="0" lvl="0" indent="-179388" algn="l" defTabSz="914400" rtl="0" eaLnBrk="1" fontAlgn="auto" latinLnBrk="0" hangingPunct="1">
+              <a:lnSpc>
+                <a:spcPct val="100000"/>
+              </a:lnSpc>
+              <a:spcBef>
+                <a:spcPct val="20000"/>
+              </a:spcBef>
+              <a:spcAft>
+                <a:spcPts val="0"/>
+              </a:spcAft>
+              <a:buClrTx/>
+              <a:buSzTx/>
+              <a:buFont typeface="Arial" pitchFamily="34" charset="0"/>
+              <a:buChar char="•"/>
+              <a:tabLst/>
+              <a:defRPr/>
+            </a:pPr>
+            <a:r>
+              <a:rPr kumimoji="0" lang="en-US" sz="2800" b="1" i="0" u="none" strike="noStrike" kern="1200" cap="none" spc="0" normalizeH="0" baseline="0" noProof="0" smtClean="0">
+                <a:ln>
+                  <a:noFill/>
+                </a:ln>
+                <a:solidFill>
+                  <a:schemeClr val="tx1"/>
+                </a:solidFill>
+                <a:effectLst/>
+                <a:uLnTx/>
+                <a:uFillTx/>
+                <a:latin typeface="+mn-lt"/>
+                <a:ea typeface="+mn-ea"/>
+                <a:cs typeface="+mn-cs"/>
+              </a:rPr>
+              <a:t>scratchClient can do much more…</a:t>
+            </a:r>
+          </a:p>
+          <a:p>
+            <a:pPr marL="179388" marR="0" lvl="0" indent="-179388" algn="l" defTabSz="914400" rtl="0" eaLnBrk="1" fontAlgn="auto" latinLnBrk="0" hangingPunct="1">
+              <a:lnSpc>
+                <a:spcPct val="100000"/>
+              </a:lnSpc>
+              <a:spcBef>
+                <a:spcPct val="20000"/>
+              </a:spcBef>
+              <a:spcAft>
+                <a:spcPts val="0"/>
+              </a:spcAft>
+              <a:buClrTx/>
+              <a:buSzTx/>
+              <a:buFont typeface="Arial" pitchFamily="34" charset="0"/>
+              <a:buChar char="•"/>
+              <a:tabLst/>
+              <a:defRPr/>
+            </a:pPr>
+            <a:r>
+              <a:rPr kumimoji="0" lang="en-US" sz="2800" b="0" i="0" u="none" strike="noStrike" kern="1200" cap="none" spc="0" normalizeH="0" baseline="0" noProof="0" smtClean="0">
+                <a:ln>
+                  <a:noFill/>
+                </a:ln>
+                <a:solidFill>
+                  <a:schemeClr val="tx1"/>
+                </a:solidFill>
+                <a:effectLst/>
+                <a:uLnTx/>
+                <a:uFillTx/>
+                <a:latin typeface="+mn-lt"/>
+                <a:ea typeface="+mn-ea"/>
+                <a:cs typeface="+mn-cs"/>
+              </a:rPr>
+              <a:t>There are some anomalies, therefore </a:t>
+            </a:r>
+          </a:p>
+          <a:p>
+            <a:pPr marL="447675" marR="0" lvl="1" indent="-193675" algn="l" defTabSz="914400" rtl="0" eaLnBrk="1" fontAlgn="auto" latinLnBrk="0" hangingPunct="1">
+              <a:lnSpc>
+                <a:spcPct val="100000"/>
+              </a:lnSpc>
+              <a:spcBef>
+                <a:spcPct val="20000"/>
+              </a:spcBef>
+              <a:spcAft>
+                <a:spcPts val="0"/>
+              </a:spcAft>
+              <a:buClrTx/>
+              <a:buSzTx/>
+              <a:buFont typeface="Arial" pitchFamily="34" charset="0"/>
+              <a:buChar char="–"/>
+              <a:tabLst/>
+              <a:defRPr/>
+            </a:pPr>
+            <a:r>
+              <a:rPr kumimoji="0" lang="en-US" sz="2400" b="0" i="0" u="none" strike="noStrike" kern="1200" cap="none" spc="0" normalizeH="0" baseline="0" noProof="0" smtClean="0">
+                <a:ln>
+                  <a:noFill/>
+                </a:ln>
+                <a:solidFill>
+                  <a:schemeClr val="tx1"/>
+                </a:solidFill>
+                <a:effectLst/>
+                <a:uLnTx/>
+                <a:uFillTx/>
+                <a:latin typeface="+mn-lt"/>
+                <a:ea typeface="+mn-ea"/>
+                <a:cs typeface="+mn-cs"/>
+              </a:rPr>
+              <a:t>Save the Scratch 2 files in the home folder (as Scratch 2 proposes)</a:t>
+            </a:r>
+          </a:p>
+          <a:p>
+            <a:pPr marL="447675" marR="0" lvl="1" indent="-193675" algn="l" defTabSz="914400" rtl="0" eaLnBrk="1" fontAlgn="auto" latinLnBrk="0" hangingPunct="1">
+              <a:lnSpc>
+                <a:spcPct val="100000"/>
+              </a:lnSpc>
+              <a:spcBef>
+                <a:spcPct val="20000"/>
+              </a:spcBef>
+              <a:spcAft>
+                <a:spcPts val="0"/>
+              </a:spcAft>
+              <a:buClrTx/>
+              <a:buSzTx/>
+              <a:buFont typeface="Arial" pitchFamily="34" charset="0"/>
+              <a:buChar char="–"/>
+              <a:tabLst/>
+              <a:defRPr/>
+            </a:pPr>
+            <a:r>
+              <a:rPr kumimoji="0" lang="en-US" sz="2400" b="0" i="0" u="none" strike="noStrike" kern="1200" cap="none" spc="0" normalizeH="0" baseline="0" noProof="0" smtClean="0">
+                <a:ln>
+                  <a:noFill/>
+                </a:ln>
+                <a:solidFill>
+                  <a:schemeClr val="tx1"/>
+                </a:solidFill>
+                <a:effectLst/>
+                <a:uLnTx/>
+                <a:uFillTx/>
+                <a:latin typeface="+mn-lt"/>
+                <a:ea typeface="+mn-ea"/>
+                <a:cs typeface="+mn-cs"/>
+              </a:rPr>
+              <a:t>Run CleanUpScratchFiles.sh on the desktop (once after start up of the RPi)</a:t>
+            </a:r>
+          </a:p>
+          <a:p>
+            <a:pPr marL="447675" marR="0" lvl="1" indent="-193675" algn="l" defTabSz="914400" rtl="0" eaLnBrk="1" fontAlgn="auto" latinLnBrk="0" hangingPunct="1">
+              <a:lnSpc>
+                <a:spcPct val="100000"/>
+              </a:lnSpc>
+              <a:spcBef>
+                <a:spcPct val="20000"/>
+              </a:spcBef>
+              <a:spcAft>
+                <a:spcPts val="0"/>
+              </a:spcAft>
+              <a:buClrTx/>
+              <a:buSzTx/>
+              <a:buFont typeface="Arial" pitchFamily="34" charset="0"/>
+              <a:buChar char="–"/>
+              <a:tabLst/>
+              <a:defRPr/>
+            </a:pPr>
+            <a:r>
+              <a:rPr kumimoji="0" lang="en-US" sz="2400" b="0" i="0" u="none" strike="noStrike" kern="1200" cap="none" spc="0" normalizeH="0" baseline="0" noProof="0" smtClean="0">
+                <a:ln>
+                  <a:noFill/>
+                </a:ln>
+                <a:solidFill>
+                  <a:schemeClr val="tx1"/>
+                </a:solidFill>
+                <a:effectLst/>
+                <a:uLnTx/>
+                <a:uFillTx/>
+                <a:latin typeface="+mn-lt"/>
+                <a:ea typeface="+mn-ea"/>
+                <a:cs typeface="+mn-cs"/>
+              </a:rPr>
+              <a:t>Use the files on the desktop</a:t>
+            </a:r>
+            <a:endParaRPr kumimoji="0" lang="en-US" sz="2400" b="0" i="0" u="none" strike="noStrike" kern="1200" cap="none" spc="0" normalizeH="0" baseline="0" noProof="0" dirty="0" smtClean="0">
+              <a:ln>
+                <a:noFill/>
+              </a:ln>
+              <a:solidFill>
+                <a:schemeClr val="tx1"/>
+              </a:solidFill>
+              <a:effectLst/>
+              <a:uLnTx/>
+              <a:uFillTx/>
+              <a:latin typeface="+mn-lt"/>
+              <a:ea typeface="+mn-ea"/>
+              <a:cs typeface="+mn-cs"/>
+            </a:endParaRPr>
           </a:p>
         </p:txBody>
       </p:sp>
@@ -10021,14 +10427,38 @@
             <a:pPr lvl="1"/>
             <a:r>
               <a:rPr lang="en-US" dirty="0" smtClean="0"/>
-              <a:t>First pull the USB cable out</a:t>
-            </a:r>
-          </a:p>
-          <a:p>
-            <a:pPr lvl="1"/>
+              <a:t>First pull </a:t>
+            </a:r>
             <a:r>
               <a:rPr lang="en-US" dirty="0" smtClean="0"/>
-              <a:t>Switch off the 9V supply</a:t>
+              <a:t>out the power </a:t>
+            </a:r>
+          </a:p>
+          <a:p>
+            <a:pPr lvl="2"/>
+            <a:r>
+              <a:rPr lang="en-US" dirty="0" smtClean="0"/>
+              <a:t>the </a:t>
+            </a:r>
+            <a:r>
+              <a:rPr lang="en-US" dirty="0" smtClean="0"/>
+              <a:t>USB </a:t>
+            </a:r>
+            <a:r>
+              <a:rPr lang="en-US" dirty="0" smtClean="0"/>
+              <a:t>cable</a:t>
+            </a:r>
+            <a:endParaRPr lang="en-US" dirty="0" smtClean="0"/>
+          </a:p>
+          <a:p>
+            <a:pPr lvl="2"/>
+            <a:r>
+              <a:rPr lang="en-US" dirty="0" smtClean="0"/>
+              <a:t>the 9V </a:t>
+            </a:r>
+            <a:r>
+              <a:rPr lang="en-US" dirty="0" smtClean="0"/>
+              <a:t>supply</a:t>
             </a:r>
             <a:endParaRPr lang="nl-NL" dirty="0"/>
           </a:p>
@@ -10244,22 +10674,18 @@
           </a:fontRef>
         </p:style>
         <p:txBody>
-          <a:bodyPr rtlCol="0" anchor="ctr"/>
-          <a:lstStyle/>
-          <a:p>
-            <a:pPr algn="ctr"/>
+          <a:bodyPr rtlCol="0" anchor="b" anchorCtr="0"/>
+          <a:lstStyle/>
+          <a:p>
             <a:endParaRPr lang="en-US" dirty="0" smtClean="0"/>
           </a:p>
           <a:p>
-            <a:pPr algn="ctr"/>
             <a:endParaRPr lang="en-US" dirty="0" smtClean="0"/>
           </a:p>
           <a:p>
-            <a:pPr algn="ctr"/>
             <a:endParaRPr lang="en-US" dirty="0" smtClean="0"/>
           </a:p>
           <a:p>
-            <a:pPr algn="ctr"/>
             <a:r>
               <a:rPr lang="en-US" dirty="0" err="1" smtClean="0"/>
               <a:t>Arduino</a:t>
@@ -10656,9 +11082,9 @@
           <p:nvPr/>
         </p:nvCxnSpPr>
         <p:spPr>
-          <a:xfrm flipH="1" flipV="1">
-            <a:off x="2123728" y="3649088"/>
-            <a:ext cx="1008112" cy="2782"/>
+          <a:xfrm flipH="1">
+            <a:off x="2528218" y="3651870"/>
+            <a:ext cx="603622" cy="392"/>
           </a:xfrm>
           <a:prstGeom prst="line">
             <a:avLst/>
@@ -10681,43 +11107,6 @@
       </p:cxnSp>
       <p:sp>
         <p:nvSpPr>
-          <p:cNvPr id="32" name="Tekstvak 31"/>
-          <p:cNvSpPr txBox="1"/>
-          <p:nvPr/>
-        </p:nvSpPr>
-        <p:spPr>
-          <a:xfrm>
-            <a:off x="1575222" y="3464422"/>
-            <a:ext cx="548506" cy="369332"/>
-          </a:xfrm>
-          <a:prstGeom prst="rect">
-            <a:avLst/>
-          </a:prstGeom>
-          <a:solidFill>
-            <a:srgbClr val="FFFF00"/>
-          </a:solidFill>
-          <a:ln w="19050">
-            <a:solidFill>
-              <a:schemeClr val="tx1"/>
-            </a:solidFill>
-          </a:ln>
-        </p:spPr>
-        <p:txBody>
-          <a:bodyPr wrap="square" rtlCol="0">
-            <a:spAutoFit/>
-          </a:bodyPr>
-          <a:lstStyle/>
-          <a:p>
-            <a:r>
-              <a:rPr lang="en-US" sz="900" dirty="0" smtClean="0"/>
-              <a:t>Analog input</a:t>
-            </a:r>
-            <a:endParaRPr lang="nl-NL" sz="900" dirty="0"/>
-          </a:p>
-        </p:txBody>
-      </p:sp>
-      <p:sp>
-        <p:nvSpPr>
           <p:cNvPr id="38" name="Tekstvak 37"/>
           <p:cNvSpPr txBox="1"/>
           <p:nvPr/>
@@ -10787,13 +11176,7 @@
               <a:rPr lang="en-US" sz="1200" dirty="0" smtClean="0">
                 <a:sym typeface="Wingdings" pitchFamily="2" charset="2"/>
               </a:rPr>
-              <a:t> short circuit</a:t>
-            </a:r>
-            <a:r>
-              <a:rPr lang="en-US" sz="1200" dirty="0" smtClean="0">
-                <a:sym typeface="Wingdings" pitchFamily="2" charset="2"/>
-              </a:rPr>
-              <a:t>!</a:t>
+              <a:t> short circuit!</a:t>
             </a:r>
           </a:p>
           <a:p>
@@ -10891,9 +11274,9 @@
           <p:nvPr/>
         </p:nvCxnSpPr>
         <p:spPr>
-          <a:xfrm flipV="1">
-            <a:off x="2339752" y="4731990"/>
-            <a:ext cx="0" cy="216024"/>
+          <a:xfrm flipH="1" flipV="1">
+            <a:off x="2339752" y="3795886"/>
+            <a:ext cx="2" cy="1152128"/>
           </a:xfrm>
           <a:prstGeom prst="line">
             <a:avLst/>
@@ -11009,6 +11392,43 @@
           </a:fontRef>
         </p:style>
       </p:cxnSp>
+      <p:sp>
+        <p:nvSpPr>
+          <p:cNvPr id="32" name="Tekstvak 31"/>
+          <p:cNvSpPr txBox="1"/>
+          <p:nvPr/>
+        </p:nvSpPr>
+        <p:spPr>
+          <a:xfrm>
+            <a:off x="1979712" y="3467596"/>
+            <a:ext cx="548506" cy="369332"/>
+          </a:xfrm>
+          <a:prstGeom prst="rect">
+            <a:avLst/>
+          </a:prstGeom>
+          <a:solidFill>
+            <a:srgbClr val="FFFF00"/>
+          </a:solidFill>
+          <a:ln w="19050">
+            <a:solidFill>
+              <a:schemeClr val="tx1"/>
+            </a:solidFill>
+          </a:ln>
+        </p:spPr>
+        <p:txBody>
+          <a:bodyPr wrap="square" rtlCol="0">
+            <a:spAutoFit/>
+          </a:bodyPr>
+          <a:lstStyle/>
+          <a:p>
+            <a:r>
+              <a:rPr lang="en-US" sz="900" dirty="0" smtClean="0"/>
+              <a:t>Analog input</a:t>
+            </a:r>
+            <a:endParaRPr lang="nl-NL" sz="900" dirty="0"/>
+          </a:p>
+        </p:txBody>
+      </p:sp>
     </p:spTree>
   </p:cSld>
   <p:clrMapOvr>
@@ -11846,7 +12266,7 @@
                   <a:schemeClr val="bg1"/>
                 </a:solidFill>
               </a:rPr>
-              <a:t>Don’t forget: power off and USB cable out before making changes!</a:t>
+              <a:t>Don’t forget: 9V and USB cable out before making changes!</a:t>
             </a:r>
             <a:endParaRPr lang="nl-NL" dirty="0">
               <a:solidFill>
@@ -12183,13 +12603,8 @@
             <a:pPr lvl="1"/>
             <a:r>
               <a:rPr lang="en-US" dirty="0" smtClean="0"/>
-              <a:t>Between about 0 and about </a:t>
-            </a:r>
-            <a:r>
-              <a:rPr lang="en-US" dirty="0" smtClean="0"/>
-              <a:t>1023</a:t>
-            </a:r>
-            <a:endParaRPr lang="en-US" dirty="0" smtClean="0"/>
+              <a:t>Between about 0 and about 1023</a:t>
+            </a:r>
           </a:p>
           <a:p>
             <a:r>

</xml_diff>

<commit_message>
Update of the tutorials
</commit_message>
<xml_diff>
--- a/scratchClientTutorial/UK---English/UK - 2 - scratchCl Intermediate Tutorial.pptx
+++ b/scratchClientTutorial/UK---English/UK - 2 - scratchCl Intermediate Tutorial.pptx
@@ -221,7 +221,7 @@
             <a:fld id="{DB6A203D-5BB1-439B-9A8B-0C4974EC0C08}" type="datetimeFigureOut">
               <a:rPr lang="nl-NL" smtClean="0"/>
               <a:pPr/>
-              <a:t>26-8-2018</a:t>
+              <a:t>2-9-2018</a:t>
             </a:fld>
             <a:endParaRPr lang="nl-NL"/>
           </a:p>
@@ -2379,7 +2379,7 @@
     <p:bg>
       <p:bgPr>
         <a:solidFill>
-          <a:srgbClr val="FF3300"/>
+          <a:srgbClr val="FF9900"/>
         </a:solidFill>
         <a:effectLst/>
       </p:bgPr>
@@ -5248,7 +5248,15 @@
                   <a:schemeClr val="bg1"/>
                 </a:solidFill>
               </a:rPr>
-              <a:t>Workshop for the Pi And More conference</a:t>
+              <a:t>Workshop for the Pi And More </a:t>
+            </a:r>
+            <a:r>
+              <a:rPr lang="en-US" dirty="0" smtClean="0">
+                <a:solidFill>
+                  <a:schemeClr val="bg1"/>
+                </a:solidFill>
+              </a:rPr>
+              <a:t>and Maker Faire conferences</a:t>
             </a:r>
             <a:endParaRPr lang="nl-NL" dirty="0">
               <a:solidFill>
@@ -6337,7 +6345,6 @@
               <a:rPr lang="en-US" dirty="0" smtClean="0"/>
               <a:t>Reconnect USB and 9V adapter</a:t>
             </a:r>
-            <a:endParaRPr lang="en-US" dirty="0" smtClean="0"/>
           </a:p>
           <a:p>
             <a:r>
@@ -7506,23 +7513,7 @@
                   <a:schemeClr val="bg1"/>
                 </a:solidFill>
               </a:rPr>
-              <a:t>Don’t forget: </a:t>
-            </a:r>
-            <a:r>
-              <a:rPr lang="en-US" dirty="0" smtClean="0">
-                <a:solidFill>
-                  <a:schemeClr val="bg1"/>
-                </a:solidFill>
-              </a:rPr>
-              <a:t>9V and </a:t>
-            </a:r>
-            <a:r>
-              <a:rPr lang="en-US" dirty="0" smtClean="0">
-                <a:solidFill>
-                  <a:schemeClr val="bg1"/>
-                </a:solidFill>
-              </a:rPr>
-              <a:t>USB cable out before making changes!</a:t>
+              <a:t>Don’t forget: 9V and USB cable out before making changes!</a:t>
             </a:r>
             <a:endParaRPr lang="nl-NL" dirty="0">
               <a:solidFill>
@@ -9449,19 +9440,7 @@
             <a:pPr algn="ctr"/>
             <a:r>
               <a:rPr lang="en-US" dirty="0" smtClean="0"/>
-              <a:t>Part </a:t>
-            </a:r>
-            <a:r>
-              <a:rPr lang="en-US" dirty="0" smtClean="0"/>
-              <a:t>3</a:t>
-            </a:r>
-            <a:r>
-              <a:rPr lang="en-US" dirty="0" smtClean="0"/>
-              <a:t>: </a:t>
-            </a:r>
-            <a:r>
-              <a:rPr lang="en-US" dirty="0" smtClean="0"/>
-              <a:t>Summary &amp; take </a:t>
+              <a:t>Part 3: Summary &amp; take </a:t>
             </a:r>
             <a:r>
               <a:rPr lang="en-US" dirty="0" err="1" smtClean="0"/>
@@ -9727,7 +9706,7 @@
               <a:defRPr/>
             </a:pPr>
             <a:r>
-              <a:rPr kumimoji="0" lang="en-US" sz="2800" b="0" i="0" u="none" strike="noStrike" kern="1200" cap="none" spc="0" normalizeH="0" baseline="0" noProof="0" smtClean="0">
+              <a:rPr kumimoji="0" lang="en-US" sz="2800" b="0" i="0" u="none" strike="noStrike" kern="1200" cap="none" spc="0" normalizeH="0" baseline="0" noProof="0" dirty="0" smtClean="0">
                 <a:ln>
                   <a:noFill/>
                 </a:ln>
@@ -9741,7 +9720,41 @@
                 <a:ea typeface="+mn-ea"/>
                 <a:cs typeface="+mn-cs"/>
               </a:rPr>
-              <a:t>With scratchClient you define:</a:t>
+              <a:t>With </a:t>
+            </a:r>
+            <a:r>
+              <a:rPr kumimoji="0" lang="en-US" sz="2800" b="0" i="0" u="none" strike="noStrike" kern="1200" cap="none" spc="0" normalizeH="0" baseline="0" noProof="0" dirty="0" err="1" smtClean="0">
+                <a:ln>
+                  <a:noFill/>
+                </a:ln>
+                <a:solidFill>
+                  <a:schemeClr val="tx1"/>
+                </a:solidFill>
+                <a:effectLst/>
+                <a:uLnTx/>
+                <a:uFillTx/>
+                <a:latin typeface="+mn-lt"/>
+                <a:ea typeface="+mn-ea"/>
+                <a:cs typeface="+mn-cs"/>
+              </a:rPr>
+              <a:t>scratchClient</a:t>
+            </a:r>
+            <a:r>
+              <a:rPr kumimoji="0" lang="en-US" sz="2800" b="0" i="0" u="none" strike="noStrike" kern="1200" cap="none" spc="0" normalizeH="0" baseline="0" noProof="0" dirty="0" smtClean="0">
+                <a:ln>
+                  <a:noFill/>
+                </a:ln>
+                <a:solidFill>
+                  <a:schemeClr val="tx1"/>
+                </a:solidFill>
+                <a:effectLst/>
+                <a:uLnTx/>
+                <a:uFillTx/>
+                <a:latin typeface="+mn-lt"/>
+                <a:ea typeface="+mn-ea"/>
+                <a:cs typeface="+mn-cs"/>
+              </a:rPr>
+              <a:t> you define:</a:t>
             </a:r>
           </a:p>
           <a:p>
@@ -9763,7 +9776,7 @@
               <a:defRPr/>
             </a:pPr>
             <a:r>
-              <a:rPr kumimoji="0" lang="en-US" sz="2400" b="0" i="0" u="none" strike="noStrike" kern="1200" cap="none" spc="0" normalizeH="0" baseline="0" noProof="0" smtClean="0">
+              <a:rPr kumimoji="0" lang="en-US" sz="2400" b="0" i="0" u="none" strike="noStrike" kern="1200" cap="none" spc="0" normalizeH="0" baseline="0" noProof="0" dirty="0" smtClean="0">
                 <a:ln>
                   <a:noFill/>
                 </a:ln>
@@ -9799,7 +9812,7 @@
               <a:defRPr/>
             </a:pPr>
             <a:r>
-              <a:rPr kumimoji="0" lang="en-US" sz="2400" b="0" i="0" u="none" strike="noStrike" kern="1200" cap="none" spc="0" normalizeH="0" baseline="0" noProof="0" smtClean="0">
+              <a:rPr kumimoji="0" lang="en-US" sz="2400" b="0" i="0" u="none" strike="noStrike" kern="1200" cap="none" spc="0" normalizeH="0" baseline="0" noProof="0" dirty="0" smtClean="0">
                 <a:ln>
                   <a:noFill/>
                 </a:ln>
@@ -9835,7 +9848,7 @@
               <a:defRPr/>
             </a:pPr>
             <a:r>
-              <a:rPr kumimoji="0" lang="en-US" sz="2800" b="0" i="0" u="none" strike="noStrike" kern="1200" cap="none" spc="0" normalizeH="0" baseline="0" noProof="0" smtClean="0">
+              <a:rPr kumimoji="0" lang="en-US" sz="2800" b="0" i="0" u="none" strike="noStrike" kern="1200" cap="none" spc="0" normalizeH="0" baseline="0" noProof="0" dirty="0" err="1" smtClean="0">
                 <a:ln>
                   <a:noFill/>
                 </a:ln>
@@ -9849,7 +9862,58 @@
                 <a:ea typeface="+mn-ea"/>
                 <a:cs typeface="+mn-cs"/>
               </a:rPr>
-              <a:t>scratchClient config is the tool to setup the configuration </a:t>
+              <a:t>scratchClient</a:t>
+            </a:r>
+            <a:r>
+              <a:rPr kumimoji="0" lang="en-US" sz="2800" b="0" i="0" u="none" strike="noStrike" kern="1200" cap="none" spc="0" normalizeH="0" baseline="0" noProof="0" dirty="0" smtClean="0">
+                <a:ln>
+                  <a:noFill/>
+                </a:ln>
+                <a:solidFill>
+                  <a:schemeClr val="tx1"/>
+                </a:solidFill>
+                <a:effectLst/>
+                <a:uLnTx/>
+                <a:uFillTx/>
+                <a:latin typeface="+mn-lt"/>
+                <a:ea typeface="+mn-ea"/>
+                <a:cs typeface="+mn-cs"/>
+              </a:rPr>
+              <a:t> </a:t>
+            </a:r>
+            <a:r>
+              <a:rPr kumimoji="0" lang="en-US" sz="2800" b="0" i="0" u="none" strike="noStrike" kern="1200" cap="none" spc="0" normalizeH="0" baseline="0" noProof="0" dirty="0" err="1" smtClean="0">
+                <a:ln>
+                  <a:noFill/>
+                </a:ln>
+                <a:solidFill>
+                  <a:schemeClr val="tx1"/>
+                </a:solidFill>
+                <a:effectLst/>
+                <a:uLnTx/>
+                <a:uFillTx/>
+                <a:latin typeface="+mn-lt"/>
+                <a:ea typeface="+mn-ea"/>
+                <a:cs typeface="+mn-cs"/>
+              </a:rPr>
+              <a:t>config</a:t>
+            </a:r>
+            <a:r>
+              <a:rPr kumimoji="0" lang="en-US" sz="2800" b="0" i="0" u="none" strike="noStrike" kern="1200" cap="none" spc="0" normalizeH="0" baseline="0" noProof="0" dirty="0" smtClean="0">
+                <a:ln>
+                  <a:noFill/>
+                </a:ln>
+                <a:solidFill>
+                  <a:schemeClr val="tx1"/>
+                </a:solidFill>
+                <a:effectLst/>
+                <a:uLnTx/>
+                <a:uFillTx/>
+                <a:latin typeface="+mn-lt"/>
+                <a:ea typeface="+mn-ea"/>
+                <a:cs typeface="+mn-cs"/>
+              </a:rPr>
+              <a:t> is the tool to setup the configuration </a:t>
             </a:r>
           </a:p>
           <a:p>
@@ -9871,7 +9935,7 @@
               <a:defRPr/>
             </a:pPr>
             <a:r>
-              <a:rPr kumimoji="0" lang="en-US" sz="2800" b="0" i="0" u="none" strike="noStrike" kern="1200" cap="none" spc="0" normalizeH="0" baseline="0" noProof="0" smtClean="0">
+              <a:rPr kumimoji="0" lang="en-US" sz="2800" b="0" i="0" u="none" strike="noStrike" kern="1200" cap="none" spc="0" normalizeH="0" baseline="0" noProof="0" dirty="0" smtClean="0">
                 <a:ln>
                   <a:noFill/>
                 </a:ln>
@@ -9885,7 +9949,41 @@
                 <a:ea typeface="+mn-ea"/>
                 <a:cs typeface="+mn-cs"/>
               </a:rPr>
-              <a:t>Restart scratchClient after you changed the configuration</a:t>
+              <a:t>Restart </a:t>
+            </a:r>
+            <a:r>
+              <a:rPr kumimoji="0" lang="en-US" sz="2800" b="0" i="0" u="none" strike="noStrike" kern="1200" cap="none" spc="0" normalizeH="0" baseline="0" noProof="0" dirty="0" err="1" smtClean="0">
+                <a:ln>
+                  <a:noFill/>
+                </a:ln>
+                <a:solidFill>
+                  <a:schemeClr val="tx1"/>
+                </a:solidFill>
+                <a:effectLst/>
+                <a:uLnTx/>
+                <a:uFillTx/>
+                <a:latin typeface="+mn-lt"/>
+                <a:ea typeface="+mn-ea"/>
+                <a:cs typeface="+mn-cs"/>
+              </a:rPr>
+              <a:t>scratchClient</a:t>
+            </a:r>
+            <a:r>
+              <a:rPr kumimoji="0" lang="en-US" sz="2800" b="0" i="0" u="none" strike="noStrike" kern="1200" cap="none" spc="0" normalizeH="0" baseline="0" noProof="0" dirty="0" smtClean="0">
+                <a:ln>
+                  <a:noFill/>
+                </a:ln>
+                <a:solidFill>
+                  <a:schemeClr val="tx1"/>
+                </a:solidFill>
+                <a:effectLst/>
+                <a:uLnTx/>
+                <a:uFillTx/>
+                <a:latin typeface="+mn-lt"/>
+                <a:ea typeface="+mn-ea"/>
+                <a:cs typeface="+mn-cs"/>
+              </a:rPr>
+              <a:t> after you changed the configuration</a:t>
             </a:r>
           </a:p>
           <a:p>
@@ -9907,7 +10005,7 @@
               <a:defRPr/>
             </a:pPr>
             <a:r>
-              <a:rPr kumimoji="0" lang="en-US" sz="2800" b="0" i="0" u="none" strike="noStrike" kern="1200" cap="none" spc="0" normalizeH="0" baseline="0" noProof="0" smtClean="0">
+              <a:rPr kumimoji="0" lang="en-US" sz="2800" b="0" i="0" u="none" strike="noStrike" kern="1200" cap="none" spc="0" normalizeH="0" baseline="0" noProof="0" dirty="0" smtClean="0">
                 <a:ln>
                   <a:noFill/>
                 </a:ln>
@@ -9943,7 +10041,7 @@
               <a:defRPr/>
             </a:pPr>
             <a:r>
-              <a:rPr kumimoji="0" lang="en-US" sz="2800" b="0" i="0" u="none" strike="noStrike" kern="1200" cap="none" spc="0" normalizeH="0" baseline="0" noProof="0" smtClean="0">
+              <a:rPr kumimoji="0" lang="en-US" sz="2800" b="0" i="0" u="none" strike="noStrike" kern="1200" cap="none" spc="0" normalizeH="0" baseline="0" noProof="0" dirty="0" smtClean="0">
                 <a:ln>
                   <a:noFill/>
                 </a:ln>
@@ -9979,7 +10077,7 @@
               <a:defRPr/>
             </a:pPr>
             <a:r>
-              <a:rPr kumimoji="0" lang="en-US" sz="2800" b="0" i="0" u="none" strike="noStrike" kern="1200" cap="none" spc="0" normalizeH="0" baseline="0" noProof="0" smtClean="0">
+              <a:rPr kumimoji="0" lang="en-US" sz="2800" b="0" i="0" u="none" strike="noStrike" kern="1200" cap="none" spc="0" normalizeH="0" baseline="0" noProof="0" dirty="0" smtClean="0">
                 <a:ln>
                   <a:noFill/>
                 </a:ln>
@@ -9993,7 +10091,7 @@
                 <a:ea typeface="+mn-ea"/>
                 <a:cs typeface="+mn-cs"/>
               </a:rPr>
-              <a:t>Configure a pull up resistor if the input signal goes between 0 Volt and being open rather than between 0 Volt and 3 to 5 Volt.</a:t>
+              <a:t>Configure a pull up resistor if the input signal goes between 0 volt and being open rather than between 0 volt and 3 to 5 volt.</a:t>
             </a:r>
           </a:p>
           <a:p>
@@ -10015,7 +10113,7 @@
               <a:defRPr/>
             </a:pPr>
             <a:r>
-              <a:rPr kumimoji="0" lang="en-US" sz="2800" b="0" i="0" u="none" strike="noStrike" kern="1200" cap="none" spc="0" normalizeH="0" baseline="0" noProof="0" smtClean="0">
+              <a:rPr kumimoji="0" lang="en-US" sz="2800" b="0" i="0" u="none" strike="noStrike" kern="1200" cap="none" spc="0" normalizeH="0" baseline="0" noProof="0" dirty="0" smtClean="0">
                 <a:ln>
                   <a:noFill/>
                 </a:ln>
@@ -10029,8 +10127,73 @@
                 <a:ea typeface="+mn-ea"/>
                 <a:cs typeface="+mn-cs"/>
               </a:rPr>
-              <a:t>In Scratch 2, you use the extension block for scratchClient to get blocks that you can use to interact with scratchClient</a:t>
-            </a:r>
+              <a:t>In Scratch 2, you use the extension block for </a:t>
+            </a:r>
+            <a:r>
+              <a:rPr kumimoji="0" lang="en-US" sz="2800" b="0" i="0" u="none" strike="noStrike" kern="1200" cap="none" spc="0" normalizeH="0" baseline="0" noProof="0" dirty="0" err="1" smtClean="0">
+                <a:ln>
+                  <a:noFill/>
+                </a:ln>
+                <a:solidFill>
+                  <a:schemeClr val="tx1"/>
+                </a:solidFill>
+                <a:effectLst/>
+                <a:uLnTx/>
+                <a:uFillTx/>
+                <a:latin typeface="+mn-lt"/>
+                <a:ea typeface="+mn-ea"/>
+                <a:cs typeface="+mn-cs"/>
+              </a:rPr>
+              <a:t>scratchClient</a:t>
+            </a:r>
+            <a:r>
+              <a:rPr kumimoji="0" lang="en-US" sz="2800" b="0" i="0" u="none" strike="noStrike" kern="1200" cap="none" spc="0" normalizeH="0" baseline="0" noProof="0" dirty="0" smtClean="0">
+                <a:ln>
+                  <a:noFill/>
+                </a:ln>
+                <a:solidFill>
+                  <a:schemeClr val="tx1"/>
+                </a:solidFill>
+                <a:effectLst/>
+                <a:uLnTx/>
+                <a:uFillTx/>
+                <a:latin typeface="+mn-lt"/>
+                <a:ea typeface="+mn-ea"/>
+                <a:cs typeface="+mn-cs"/>
+              </a:rPr>
+              <a:t> to get blocks that you can use to interact with </a:t>
+            </a:r>
+            <a:r>
+              <a:rPr kumimoji="0" lang="en-US" sz="2800" b="0" i="0" u="none" strike="noStrike" kern="1200" cap="none" spc="0" normalizeH="0" baseline="0" noProof="0" dirty="0" err="1" smtClean="0">
+                <a:ln>
+                  <a:noFill/>
+                </a:ln>
+                <a:solidFill>
+                  <a:schemeClr val="tx1"/>
+                </a:solidFill>
+                <a:effectLst/>
+                <a:uLnTx/>
+                <a:uFillTx/>
+                <a:latin typeface="+mn-lt"/>
+                <a:ea typeface="+mn-ea"/>
+                <a:cs typeface="+mn-cs"/>
+              </a:rPr>
+              <a:t>scratchClient</a:t>
+            </a:r>
+            <a:endParaRPr kumimoji="0" lang="en-US" sz="2800" b="0" i="0" u="none" strike="noStrike" kern="1200" cap="none" spc="0" normalizeH="0" baseline="0" noProof="0" dirty="0" smtClean="0">
+              <a:ln>
+                <a:noFill/>
+              </a:ln>
+              <a:solidFill>
+                <a:schemeClr val="tx1"/>
+              </a:solidFill>
+              <a:effectLst/>
+              <a:uLnTx/>
+              <a:uFillTx/>
+              <a:latin typeface="+mn-lt"/>
+              <a:ea typeface="+mn-ea"/>
+              <a:cs typeface="+mn-cs"/>
+            </a:endParaRPr>
           </a:p>
           <a:p>
             <a:pPr marL="179388" marR="0" lvl="0" indent="-179388" algn="l" defTabSz="914400" rtl="0" eaLnBrk="1" fontAlgn="auto" latinLnBrk="0" hangingPunct="1">
@@ -10051,7 +10214,7 @@
               <a:defRPr/>
             </a:pPr>
             <a:r>
-              <a:rPr kumimoji="0" lang="en-US" sz="2800" b="0" i="0" u="none" strike="noStrike" kern="1200" cap="none" spc="0" normalizeH="0" baseline="0" noProof="0" smtClean="0">
+              <a:rPr kumimoji="0" lang="en-US" sz="2800" b="0" i="0" u="none" strike="noStrike" kern="1200" cap="none" spc="0" normalizeH="0" baseline="0" noProof="0" dirty="0" smtClean="0">
                 <a:ln>
                   <a:noFill/>
                 </a:ln>
@@ -10087,7 +10250,7 @@
               <a:defRPr/>
             </a:pPr>
             <a:r>
-              <a:rPr kumimoji="0" lang="en-US" sz="2800" b="1" i="0" u="none" strike="noStrike" kern="1200" cap="none" spc="0" normalizeH="0" baseline="0" noProof="0" smtClean="0">
+              <a:rPr kumimoji="0" lang="en-US" sz="2800" b="1" i="0" u="none" strike="noStrike" kern="1200" cap="none" spc="0" normalizeH="0" baseline="0" noProof="0" dirty="0" err="1" smtClean="0">
                 <a:ln>
                   <a:noFill/>
                 </a:ln>
@@ -10101,7 +10264,24 @@
                 <a:ea typeface="+mn-ea"/>
                 <a:cs typeface="+mn-cs"/>
               </a:rPr>
-              <a:t>scratchClient can do much more…</a:t>
+              <a:t>scratchClient</a:t>
+            </a:r>
+            <a:r>
+              <a:rPr kumimoji="0" lang="en-US" sz="2800" b="1" i="0" u="none" strike="noStrike" kern="1200" cap="none" spc="0" normalizeH="0" baseline="0" noProof="0" dirty="0" smtClean="0">
+                <a:ln>
+                  <a:noFill/>
+                </a:ln>
+                <a:solidFill>
+                  <a:schemeClr val="tx1"/>
+                </a:solidFill>
+                <a:effectLst/>
+                <a:uLnTx/>
+                <a:uFillTx/>
+                <a:latin typeface="+mn-lt"/>
+                <a:ea typeface="+mn-ea"/>
+                <a:cs typeface="+mn-cs"/>
+              </a:rPr>
+              <a:t> can do much more…</a:t>
             </a:r>
           </a:p>
           <a:p>
@@ -10123,7 +10303,7 @@
               <a:defRPr/>
             </a:pPr>
             <a:r>
-              <a:rPr kumimoji="0" lang="en-US" sz="2800" b="0" i="0" u="none" strike="noStrike" kern="1200" cap="none" spc="0" normalizeH="0" baseline="0" noProof="0" smtClean="0">
+              <a:rPr kumimoji="0" lang="en-US" sz="2800" b="0" i="0" u="none" strike="noStrike" kern="1200" cap="none" spc="0" normalizeH="0" baseline="0" noProof="0" dirty="0" smtClean="0">
                 <a:ln>
                   <a:noFill/>
                 </a:ln>
@@ -10159,7 +10339,7 @@
               <a:defRPr/>
             </a:pPr>
             <a:r>
-              <a:rPr kumimoji="0" lang="en-US" sz="2400" b="0" i="0" u="none" strike="noStrike" kern="1200" cap="none" spc="0" normalizeH="0" baseline="0" noProof="0" smtClean="0">
+              <a:rPr kumimoji="0" lang="en-US" sz="2400" b="0" i="0" u="none" strike="noStrike" kern="1200" cap="none" spc="0" normalizeH="0" baseline="0" noProof="0" dirty="0" smtClean="0">
                 <a:ln>
                   <a:noFill/>
                 </a:ln>
@@ -10195,7 +10375,7 @@
               <a:defRPr/>
             </a:pPr>
             <a:r>
-              <a:rPr kumimoji="0" lang="en-US" sz="2400" b="0" i="0" u="none" strike="noStrike" kern="1200" cap="none" spc="0" normalizeH="0" baseline="0" noProof="0" smtClean="0">
+              <a:rPr kumimoji="0" lang="en-US" sz="2400" b="0" i="0" u="none" strike="noStrike" kern="1200" cap="none" spc="0" normalizeH="0" baseline="0" noProof="0" dirty="0" smtClean="0">
                 <a:ln>
                   <a:noFill/>
                 </a:ln>
@@ -10209,7 +10389,41 @@
                 <a:ea typeface="+mn-ea"/>
                 <a:cs typeface="+mn-cs"/>
               </a:rPr>
-              <a:t>Run CleanUpScratchFiles.sh on the desktop (once after start up of the RPi)</a:t>
+              <a:t>Run CleanUpScratchFiles.sh on the desktop (once after start up of the </a:t>
+            </a:r>
+            <a:r>
+              <a:rPr kumimoji="0" lang="en-US" sz="2400" b="0" i="0" u="none" strike="noStrike" kern="1200" cap="none" spc="0" normalizeH="0" baseline="0" noProof="0" dirty="0" err="1" smtClean="0">
+                <a:ln>
+                  <a:noFill/>
+                </a:ln>
+                <a:solidFill>
+                  <a:schemeClr val="tx1"/>
+                </a:solidFill>
+                <a:effectLst/>
+                <a:uLnTx/>
+                <a:uFillTx/>
+                <a:latin typeface="+mn-lt"/>
+                <a:ea typeface="+mn-ea"/>
+                <a:cs typeface="+mn-cs"/>
+              </a:rPr>
+              <a:t>RPi</a:t>
+            </a:r>
+            <a:r>
+              <a:rPr kumimoji="0" lang="en-US" sz="2400" b="0" i="0" u="none" strike="noStrike" kern="1200" cap="none" spc="0" normalizeH="0" baseline="0" noProof="0" dirty="0" smtClean="0">
+                <a:ln>
+                  <a:noFill/>
+                </a:ln>
+                <a:solidFill>
+                  <a:schemeClr val="tx1"/>
+                </a:solidFill>
+                <a:effectLst/>
+                <a:uLnTx/>
+                <a:uFillTx/>
+                <a:latin typeface="+mn-lt"/>
+                <a:ea typeface="+mn-ea"/>
+                <a:cs typeface="+mn-cs"/>
+              </a:rPr>
+              <a:t>)</a:t>
             </a:r>
           </a:p>
           <a:p>
@@ -10231,7 +10445,7 @@
               <a:defRPr/>
             </a:pPr>
             <a:r>
-              <a:rPr kumimoji="0" lang="en-US" sz="2400" b="0" i="0" u="none" strike="noStrike" kern="1200" cap="none" spc="0" normalizeH="0" baseline="0" noProof="0" smtClean="0">
+              <a:rPr kumimoji="0" lang="en-US" sz="2400" b="0" i="0" u="none" strike="noStrike" kern="1200" cap="none" spc="0" normalizeH="0" baseline="0" noProof="0" dirty="0" smtClean="0">
                 <a:ln>
                   <a:noFill/>
                 </a:ln>
@@ -10247,20 +10461,6 @@
               </a:rPr>
               <a:t>Use the files on the desktop</a:t>
             </a:r>
-            <a:endParaRPr kumimoji="0" lang="en-US" sz="2400" b="0" i="0" u="none" strike="noStrike" kern="1200" cap="none" spc="0" normalizeH="0" baseline="0" noProof="0" dirty="0" smtClean="0">
-              <a:ln>
-                <a:noFill/>
-              </a:ln>
-              <a:solidFill>
-                <a:schemeClr val="tx1"/>
-              </a:solidFill>
-              <a:effectLst/>
-              <a:uLnTx/>
-              <a:uFillTx/>
-              <a:latin typeface="+mn-lt"/>
-              <a:ea typeface="+mn-ea"/>
-              <a:cs typeface="+mn-cs"/>
-            </a:endParaRPr>
           </a:p>
         </p:txBody>
       </p:sp>
@@ -10296,17 +10496,14 @@
             <a:spLocks noGrp="1"/>
           </p:cNvSpPr>
           <p:nvPr>
-            <p:ph type="title"/>
-          </p:nvPr>
-        </p:nvSpPr>
-        <p:spPr>
-          <a:xfrm>
-            <a:off x="467544" y="1635646"/>
-            <a:ext cx="8229600" cy="2081386"/>
-          </a:xfrm>
-        </p:spPr>
-        <p:txBody>
-          <a:bodyPr/>
+            <p:ph type="ctrTitle"/>
+          </p:nvPr>
+        </p:nvSpPr>
+        <p:spPr/>
+        <p:txBody>
+          <a:bodyPr>
+            <a:normAutofit fontScale="90000"/>
+          </a:bodyPr>
           <a:lstStyle/>
           <a:p>
             <a:pPr algn="ctr"/>
@@ -10323,6 +10520,25 @@
               <a:t> workshop</a:t>
             </a:r>
             <a:endParaRPr lang="nl-NL" dirty="0"/>
+          </a:p>
+        </p:txBody>
+      </p:sp>
+      <p:sp>
+        <p:nvSpPr>
+          <p:cNvPr id="6" name="Ondertitel 5"/>
+          <p:cNvSpPr>
+            <a:spLocks noGrp="1"/>
+          </p:cNvSpPr>
+          <p:nvPr>
+            <p:ph type="subTitle" idx="1"/>
+          </p:nvPr>
+        </p:nvSpPr>
+        <p:spPr/>
+        <p:txBody>
+          <a:bodyPr/>
+          <a:lstStyle/>
+          <a:p>
+            <a:endParaRPr lang="nl-NL"/>
           </a:p>
         </p:txBody>
       </p:sp>
@@ -10427,38 +10643,21 @@
             <a:pPr lvl="1"/>
             <a:r>
               <a:rPr lang="en-US" dirty="0" smtClean="0"/>
-              <a:t>First pull </a:t>
-            </a:r>
+              <a:t>First pull out the power </a:t>
+            </a:r>
+          </a:p>
+          <a:p>
+            <a:pPr lvl="2"/>
             <a:r>
               <a:rPr lang="en-US" dirty="0" smtClean="0"/>
-              <a:t>out the power </a:t>
+              <a:t>the USB cable</a:t>
             </a:r>
           </a:p>
           <a:p>
             <a:pPr lvl="2"/>
             <a:r>
               <a:rPr lang="en-US" dirty="0" smtClean="0"/>
-              <a:t>the </a:t>
-            </a:r>
-            <a:r>
-              <a:rPr lang="en-US" dirty="0" smtClean="0"/>
-              <a:t>USB </a:t>
-            </a:r>
-            <a:r>
-              <a:rPr lang="en-US" dirty="0" smtClean="0"/>
-              <a:t>cable</a:t>
-            </a:r>
-            <a:endParaRPr lang="en-US" dirty="0" smtClean="0"/>
-          </a:p>
-          <a:p>
-            <a:pPr lvl="2"/>
-            <a:r>
-              <a:rPr lang="en-US" dirty="0" smtClean="0"/>
-              <a:t>the 9V </a:t>
-            </a:r>
-            <a:r>
-              <a:rPr lang="en-US" dirty="0" smtClean="0"/>
-              <a:t>supply</a:t>
+              <a:t>the 9V supply</a:t>
             </a:r>
             <a:endParaRPr lang="nl-NL" dirty="0"/>
           </a:p>
@@ -10589,7 +10788,7 @@
             <a:pPr lvl="1"/>
             <a:r>
               <a:rPr lang="en-US" sz="1400" dirty="0" smtClean="0"/>
-              <a:t>E.g. in the middle it would be 2.5 Volt</a:t>
+              <a:t>E.g. in the middle it would be 2.5 volt</a:t>
             </a:r>
           </a:p>
           <a:p>
@@ -10606,7 +10805,7 @@
             </a:r>
             <a:r>
               <a:rPr lang="en-US" sz="1800" dirty="0" err="1" smtClean="0"/>
-              <a:t>kOhm</a:t>
+              <a:t>kohm</a:t>
             </a:r>
             <a:r>
               <a:rPr lang="en-US" sz="1800" dirty="0" smtClean="0"/>
@@ -10866,7 +11065,7 @@
           <a:p>
             <a:r>
               <a:rPr lang="en-US" dirty="0" smtClean="0"/>
-              <a:t>+5 Volt</a:t>
+              <a:t>+5 volt</a:t>
             </a:r>
             <a:endParaRPr lang="nl-NL" dirty="0"/>
           </a:p>
@@ -10896,7 +11095,7 @@
           <a:p>
             <a:r>
               <a:rPr lang="en-US" dirty="0" smtClean="0"/>
-              <a:t>0 Volt</a:t>
+              <a:t>0 volt</a:t>
             </a:r>
             <a:endParaRPr lang="nl-NL" dirty="0"/>
           </a:p>
@@ -11032,7 +11231,7 @@
             </a:r>
             <a:r>
               <a:rPr lang="en-US" dirty="0" err="1" smtClean="0"/>
-              <a:t>kOhm</a:t>
+              <a:t>kohm</a:t>
             </a:r>
             <a:endParaRPr lang="nl-NL" dirty="0"/>
           </a:p>
@@ -11066,7 +11265,7 @@
             </a:r>
             <a:r>
               <a:rPr lang="en-US" dirty="0" err="1" smtClean="0"/>
-              <a:t>kOhm</a:t>
+              <a:t>kohm</a:t>
             </a:r>
             <a:endParaRPr lang="nl-NL" dirty="0"/>
           </a:p>
@@ -11133,7 +11332,7 @@
             </a:r>
             <a:r>
               <a:rPr lang="en-US" sz="1200" dirty="0" err="1" smtClean="0"/>
-              <a:t>kOhm</a:t>
+              <a:t>kohm</a:t>
             </a:r>
             <a:r>
               <a:rPr lang="en-US" sz="1200" dirty="0" smtClean="0"/>
@@ -11145,7 +11344,7 @@
             </a:r>
             <a:r>
               <a:rPr lang="en-US" sz="1200" dirty="0" smtClean="0"/>
-              <a:t> positioned  close to the 0 Volt side.</a:t>
+              <a:t> positioned  close to the 0 volt side.</a:t>
             </a:r>
           </a:p>
           <a:p>
@@ -11162,7 +11361,7 @@
             </a:r>
             <a:r>
               <a:rPr lang="en-US" sz="1200" dirty="0" smtClean="0"/>
-              <a:t> would output 5 Volt, and the </a:t>
+              <a:t> would output 5 volt, and the </a:t>
             </a:r>
             <a:r>
               <a:rPr lang="en-US" sz="1200" dirty="0" err="1" smtClean="0"/>
@@ -11170,7 +11369,7 @@
             </a:r>
             <a:r>
               <a:rPr lang="en-US" sz="1200" dirty="0" smtClean="0"/>
-              <a:t> is directly leading it to the 0 Volt line </a:t>
+              <a:t> is directly leading it to the 0 volt line </a:t>
             </a:r>
             <a:r>
               <a:rPr lang="en-US" sz="1200" dirty="0" smtClean="0">
@@ -11184,7 +11383,7 @@
               <a:rPr lang="en-US" sz="1200" dirty="0" smtClean="0">
                 <a:sym typeface="Wingdings" pitchFamily="2" charset="2"/>
               </a:rPr>
-              <a:t>Likewise if the potentiometer is close to the 5 Volt side and  the </a:t>
+              <a:t>Likewise if the potentiometer is close to the 5 volt side and  the </a:t>
             </a:r>
             <a:r>
               <a:rPr lang="en-US" sz="1200" dirty="0" err="1" smtClean="0">
@@ -11196,7 +11395,7 @@
               <a:rPr lang="en-US" sz="1200" dirty="0" smtClean="0">
                 <a:sym typeface="Wingdings" pitchFamily="2" charset="2"/>
               </a:rPr>
-              <a:t> would output  0 Volt.</a:t>
+              <a:t> would output  0 volt.</a:t>
             </a:r>
             <a:endParaRPr lang="nl-NL" sz="1200" dirty="0"/>
           </a:p>
@@ -12362,12 +12561,16 @@
               <a:t> file again (right click </a:t>
             </a:r>
             <a:r>
-              <a:rPr lang="en-US" i="1" dirty="0" smtClean="0"/>
-              <a:t>PiAndMoreConfig.scl</a:t>
+              <a:rPr lang="nl-NL" i="1" dirty="0" err="1" smtClean="0"/>
+              <a:t>scratchClientTutorial.scl</a:t>
+            </a:r>
+            <a:r>
+              <a:rPr lang="nl-NL" dirty="0" smtClean="0"/>
+              <a:t> </a:t>
             </a:r>
             <a:r>
               <a:rPr lang="en-US" dirty="0" smtClean="0"/>
-              <a:t> on the desktop, </a:t>
+              <a:t>on the desktop, </a:t>
             </a:r>
             <a:r>
               <a:rPr lang="en-US" dirty="0" err="1" smtClean="0"/>
@@ -12571,8 +12774,8 @@
               <a:t> by double clicking </a:t>
             </a:r>
             <a:r>
-              <a:rPr lang="en-US" i="1" dirty="0" smtClean="0"/>
-              <a:t>PiAndMoreConfig.scl</a:t>
+              <a:rPr lang="nl-NL" i="1" dirty="0" err="1" smtClean="0"/>
+              <a:t>scratchClientTutorial.scl</a:t>
             </a:r>
             <a:r>
               <a:rPr lang="en-US" dirty="0" smtClean="0"/>

</xml_diff>